<commit_message>
Added what you will accomplish.
</commit_message>
<xml_diff>
--- a/ViewModel-First Navigation.pptx
+++ b/ViewModel-First Navigation.pptx
@@ -8,7 +8,8 @@
     <p:sldId id="256" r:id="rId2"/>
     <p:sldId id="257" r:id="rId3"/>
     <p:sldId id="258" r:id="rId4"/>
-    <p:sldId id="259" r:id="rId5"/>
+    <p:sldId id="260" r:id="rId5"/>
+    <p:sldId id="259" r:id="rId6"/>
   </p:sldIdLst>
   <p:sldSz cx="12192000" cy="6858000"/>
   <p:notesSz cx="6858000" cy="9144000"/>
@@ -14978,6 +14979,12 @@
             </a:r>
           </a:p>
           <a:p>
+            <a:r>
+              <a:rPr lang="en-US" dirty="0" smtClean="0"/>
+              <a:t>Solution folders</a:t>
+            </a:r>
+          </a:p>
+          <a:p>
             <a:pPr lvl="1"/>
             <a:r>
               <a:rPr lang="en-US" dirty="0" smtClean="0"/>
@@ -15242,7 +15249,7 @@
           <a:p>
             <a:r>
               <a:rPr lang="en-US" dirty="0" smtClean="0"/>
-              <a:t>Bursts</a:t>
+              <a:t>What You Will Accomplish</a:t>
             </a:r>
             <a:endParaRPr lang="en-US" dirty="0"/>
           </a:p>
@@ -15264,6 +15271,102 @@
           <a:lstStyle/>
           <a:p>
             <a:r>
+              <a:rPr lang="en-US" dirty="0" smtClean="0"/>
+              <a:t>Use data binding to select view-model</a:t>
+            </a:r>
+          </a:p>
+          <a:p>
+            <a:r>
+              <a:rPr lang="en-US" dirty="0" smtClean="0"/>
+              <a:t>Use data template to select view</a:t>
+            </a:r>
+          </a:p>
+          <a:p>
+            <a:r>
+              <a:rPr lang="en-US" dirty="0" smtClean="0"/>
+              <a:t>Navigate forward and backward through a stack</a:t>
+            </a:r>
+          </a:p>
+          <a:p>
+            <a:r>
+              <a:rPr lang="en-US" dirty="0" smtClean="0"/>
+              <a:t>Navigate to selected data</a:t>
+            </a:r>
+          </a:p>
+          <a:p>
+            <a:endParaRPr lang="en-US" dirty="0"/>
+          </a:p>
+        </p:txBody>
+      </p:sp>
+    </p:spTree>
+    <p:extLst>
+      <p:ext uri="{BB962C8B-B14F-4D97-AF65-F5344CB8AC3E}">
+        <p14:creationId xmlns:p14="http://schemas.microsoft.com/office/powerpoint/2010/main" val="2694266951"/>
+      </p:ext>
+    </p:extLst>
+  </p:cSld>
+  <p:clrMapOvr>
+    <a:masterClrMapping/>
+  </p:clrMapOvr>
+</p:sld>
+</file>
+
+<file path=ppt/slides/slide5.xml><?xml version="1.0" encoding="utf-8"?>
+<p:sld xmlns:a="http://schemas.openxmlformats.org/drawingml/2006/main" xmlns:r="http://schemas.openxmlformats.org/officeDocument/2006/relationships" xmlns:p="http://schemas.openxmlformats.org/presentationml/2006/main">
+  <p:cSld>
+    <p:spTree>
+      <p:nvGrpSpPr>
+        <p:cNvPr id="1" name=""/>
+        <p:cNvGrpSpPr/>
+        <p:nvPr/>
+      </p:nvGrpSpPr>
+      <p:grpSpPr>
+        <a:xfrm>
+          <a:off x="0" y="0"/>
+          <a:ext cx="0" cy="0"/>
+          <a:chOff x="0" y="0"/>
+          <a:chExt cx="0" cy="0"/>
+        </a:xfrm>
+      </p:grpSpPr>
+      <p:sp>
+        <p:nvSpPr>
+          <p:cNvPr id="2" name="Title 1"/>
+          <p:cNvSpPr>
+            <a:spLocks noGrp="1"/>
+          </p:cNvSpPr>
+          <p:nvPr>
+            <p:ph type="title"/>
+          </p:nvPr>
+        </p:nvSpPr>
+        <p:spPr/>
+        <p:txBody>
+          <a:bodyPr/>
+          <a:lstStyle/>
+          <a:p>
+            <a:r>
+              <a:rPr lang="en-US" dirty="0" smtClean="0"/>
+              <a:t>Bursts</a:t>
+            </a:r>
+            <a:endParaRPr lang="en-US" dirty="0"/>
+          </a:p>
+        </p:txBody>
+      </p:sp>
+      <p:sp>
+        <p:nvSpPr>
+          <p:cNvPr id="3" name="Content Placeholder 2"/>
+          <p:cNvSpPr>
+            <a:spLocks noGrp="1"/>
+          </p:cNvSpPr>
+          <p:nvPr>
+            <p:ph idx="1"/>
+          </p:nvPr>
+        </p:nvSpPr>
+        <p:spPr/>
+        <p:txBody>
+          <a:bodyPr/>
+          <a:lstStyle/>
+          <a:p>
+            <a:r>
               <a:rPr lang="en-US" dirty="0" err="1" smtClean="0"/>
               <a:t>NavigationProvider.Contents</a:t>
             </a:r>
@@ -15287,10 +15390,9 @@
           </a:p>
           <a:p>
             <a:r>
-              <a:rPr lang="en-US" smtClean="0"/>
+              <a:rPr lang="en-US" dirty="0" smtClean="0"/>
               <a:t>Title</a:t>
             </a:r>
-            <a:endParaRPr lang="en-US" dirty="0" smtClean="0"/>
           </a:p>
           <a:p>
             <a:r>

</xml_diff>

<commit_message>
Added GitHub URL slide.
</commit_message>
<xml_diff>
--- a/ViewModel-First Navigation.pptx
+++ b/ViewModel-First Navigation.pptx
@@ -6,10 +6,11 @@
   </p:sldMasterIdLst>
   <p:sldIdLst>
     <p:sldId id="256" r:id="rId2"/>
-    <p:sldId id="257" r:id="rId3"/>
-    <p:sldId id="258" r:id="rId4"/>
-    <p:sldId id="260" r:id="rId5"/>
-    <p:sldId id="259" r:id="rId6"/>
+    <p:sldId id="261" r:id="rId3"/>
+    <p:sldId id="257" r:id="rId4"/>
+    <p:sldId id="258" r:id="rId5"/>
+    <p:sldId id="260" r:id="rId6"/>
+    <p:sldId id="259" r:id="rId7"/>
   </p:sldIdLst>
   <p:sldSz cx="12192000" cy="6858000"/>
   <p:notesSz cx="6858000" cy="9144000"/>
@@ -14892,6 +14893,13 @@
   <p:clrMapOvr>
     <a:masterClrMapping/>
   </p:clrMapOvr>
+  <p:timing>
+    <p:tnLst>
+      <p:par>
+        <p:cTn id="1" dur="indefinite" restart="never" nodeType="tmRoot"/>
+      </p:par>
+    </p:tnLst>
+  </p:timing>
 </p:sld>
 </file>
 
@@ -14928,8 +14936,8 @@
           <a:lstStyle/>
           <a:p>
             <a:r>
-              <a:rPr lang="en-US" dirty="0" smtClean="0"/>
-              <a:t>Workshop Structure</a:t>
+              <a:rPr lang="en-US" dirty="0" err="1" smtClean="0"/>
+              <a:t>GitHub</a:t>
             </a:r>
             <a:endParaRPr lang="en-US" dirty="0"/>
           </a:p>
@@ -14947,81 +14955,43 @@
         </p:nvSpPr>
         <p:spPr/>
         <p:txBody>
-          <a:bodyPr/>
+          <a:bodyPr>
+            <a:normAutofit/>
+          </a:bodyPr>
           <a:lstStyle/>
           <a:p>
+            <a:pPr marL="0" indent="0">
+              <a:buNone/>
+            </a:pPr>
             <a:r>
-              <a:rPr lang="en-US" dirty="0" smtClean="0"/>
-              <a:t>Visual Studio 2010 (Express is OK)</a:t>
-            </a:r>
-          </a:p>
-          <a:p>
-            <a:r>
-              <a:rPr lang="en-US" dirty="0" smtClean="0"/>
-              <a:t>WPF</a:t>
-            </a:r>
-          </a:p>
-          <a:p>
-            <a:r>
-              <a:rPr lang="en-US" dirty="0" smtClean="0"/>
+              <a:rPr lang="en-US" sz="5400" dirty="0" smtClean="0"/>
               <a:t>github.com/</a:t>
             </a:r>
             <a:r>
-              <a:rPr lang="en-US" dirty="0" err="1" smtClean="0"/>
+              <a:rPr lang="en-US" sz="5400" dirty="0" err="1" smtClean="0"/>
               <a:t>dallasxaml</a:t>
             </a:r>
-            <a:endParaRPr lang="en-US" dirty="0" smtClean="0"/>
-          </a:p>
-          <a:p>
-            <a:r>
-              <a:rPr lang="en-US" dirty="0" smtClean="0"/>
-              <a:t>Pull down zip file</a:t>
-            </a:r>
-          </a:p>
-          <a:p>
-            <a:r>
-              <a:rPr lang="en-US" dirty="0" smtClean="0"/>
-              <a:t>Solution folders</a:t>
-            </a:r>
-          </a:p>
-          <a:p>
-            <a:pPr lvl="1"/>
-            <a:r>
-              <a:rPr lang="en-US" dirty="0" smtClean="0"/>
-              <a:t>Workshop</a:t>
-            </a:r>
-          </a:p>
-          <a:p>
-            <a:pPr lvl="1"/>
-            <a:r>
-              <a:rPr lang="en-US" dirty="0" smtClean="0"/>
-              <a:t>Completed</a:t>
-            </a:r>
-          </a:p>
-          <a:p>
-            <a:r>
-              <a:rPr lang="en-US" dirty="0" smtClean="0"/>
-              <a:t>Burst on one feature</a:t>
-            </a:r>
-          </a:p>
-          <a:p>
-            <a:r>
-              <a:rPr lang="en-US" dirty="0" smtClean="0"/>
-              <a:t>Check in after each burst</a:t>
-            </a:r>
+            <a:endParaRPr lang="en-US" sz="5400" dirty="0"/>
           </a:p>
         </p:txBody>
       </p:sp>
     </p:spTree>
     <p:extLst>
       <p:ext uri="{BB962C8B-B14F-4D97-AF65-F5344CB8AC3E}">
-        <p14:creationId xmlns:p14="http://schemas.microsoft.com/office/powerpoint/2010/main" val="1148920223"/>
+        <p14:creationId xmlns:p14="http://schemas.microsoft.com/office/powerpoint/2010/main" val="233517617"/>
       </p:ext>
     </p:extLst>
   </p:cSld>
   <p:clrMapOvr>
     <a:masterClrMapping/>
   </p:clrMapOvr>
+  <p:timing>
+    <p:tnLst>
+      <p:par>
+        <p:cTn id="1" dur="indefinite" restart="never" nodeType="tmRoot"/>
+      </p:par>
+    </p:tnLst>
+  </p:timing>
 </p:sld>
 </file>
 
@@ -15058,12 +15028,8 @@
           <a:lstStyle/>
           <a:p>
             <a:r>
-              <a:rPr lang="en-US" dirty="0" err="1" smtClean="0"/>
-              <a:t>Git</a:t>
-            </a:r>
-            <a:r>
               <a:rPr lang="en-US" dirty="0" smtClean="0"/>
-              <a:t> Commands</a:t>
+              <a:t>Workshop Structure</a:t>
             </a:r>
             <a:endParaRPr lang="en-US" dirty="0"/>
           </a:p>
@@ -15079,139 +15045,90 @@
             <p:ph idx="1"/>
           </p:nvPr>
         </p:nvSpPr>
-        <p:spPr>
-          <a:xfrm>
-            <a:off x="2589212" y="2133599"/>
-            <a:ext cx="8915400" cy="4236027"/>
-          </a:xfrm>
-        </p:spPr>
+        <p:spPr/>
         <p:txBody>
-          <a:bodyPr>
-            <a:normAutofit/>
-          </a:bodyPr>
+          <a:bodyPr/>
           <a:lstStyle/>
           <a:p>
-            <a:r>
-              <a:rPr lang="en-US" dirty="0" err="1" smtClean="0"/>
-              <a:t>git</a:t>
-            </a:r>
             <a:r>
               <a:rPr lang="en-US" dirty="0" smtClean="0"/>
-              <a:t> </a:t>
+              <a:t>Visual Studio 2010 (Express is OK)</a:t>
             </a:r>
-            <a:r>
-              <a:rPr lang="en-US" dirty="0"/>
-              <a:t>clone git://</a:t>
-            </a:r>
+          </a:p>
+          <a:p>
             <a:r>
               <a:rPr lang="en-US" dirty="0" smtClean="0"/>
-              <a:t>github.com/dallasxaml/ViewModelFirst.git</a:t>
+              <a:t>WPF</a:t>
             </a:r>
           </a:p>
           <a:p>
             <a:r>
               <a:rPr lang="en-US" dirty="0" smtClean="0"/>
-              <a:t>cd </a:t>
+              <a:t>github.com/</a:t>
             </a:r>
             <a:r>
               <a:rPr lang="en-US" dirty="0" err="1" smtClean="0"/>
-              <a:t>ViewModelFirst</a:t>
+              <a:t>dallasxaml</a:t>
             </a:r>
             <a:endParaRPr lang="en-US" dirty="0" smtClean="0"/>
           </a:p>
           <a:p>
             <a:r>
-              <a:rPr lang="en-US" dirty="0" err="1" smtClean="0"/>
-              <a:t>git</a:t>
+              <a:rPr lang="en-US" dirty="0" smtClean="0"/>
+              <a:t>Pull down zip file</a:t>
             </a:r>
+          </a:p>
+          <a:p>
             <a:r>
               <a:rPr lang="en-US" dirty="0" smtClean="0"/>
-              <a:t> branch take1</a:t>
+              <a:t>Solution folders</a:t>
             </a:r>
           </a:p>
           <a:p>
-            <a:r>
-              <a:rPr lang="en-US" dirty="0" err="1" smtClean="0"/>
-              <a:t>git</a:t>
-            </a:r>
+            <a:pPr lvl="1"/>
             <a:r>
               <a:rPr lang="en-US" dirty="0" smtClean="0"/>
-              <a:t> checkout take1</a:t>
+              <a:t>Workshop</a:t>
             </a:r>
           </a:p>
           <a:p>
-            <a:r>
-              <a:rPr lang="en-US" dirty="0" err="1" smtClean="0"/>
-              <a:t>git</a:t>
-            </a:r>
+            <a:pPr lvl="1"/>
             <a:r>
               <a:rPr lang="en-US" dirty="0" smtClean="0"/>
-              <a:t> add –A</a:t>
+              <a:t>Completed</a:t>
             </a:r>
           </a:p>
           <a:p>
-            <a:r>
-              <a:rPr lang="en-US" dirty="0" err="1" smtClean="0"/>
-              <a:t>git</a:t>
-            </a:r>
             <a:r>
               <a:rPr lang="en-US" dirty="0" smtClean="0"/>
-              <a:t> commit –m “&lt;commit message&gt;”</a:t>
+              <a:t>Burst on one feature</a:t>
             </a:r>
           </a:p>
           <a:p>
-            <a:r>
-              <a:rPr lang="en-US" dirty="0" err="1" smtClean="0"/>
-              <a:t>git</a:t>
-            </a:r>
             <a:r>
               <a:rPr lang="en-US" dirty="0" smtClean="0"/>
-              <a:t> checkout master</a:t>
+              <a:t>Check in after each burst</a:t>
             </a:r>
-          </a:p>
-          <a:p>
-            <a:r>
-              <a:rPr lang="en-US" dirty="0" err="1" smtClean="0"/>
-              <a:t>git</a:t>
-            </a:r>
-            <a:r>
-              <a:rPr lang="en-US" dirty="0" smtClean="0"/>
-              <a:t> pull origin master</a:t>
-            </a:r>
-          </a:p>
-          <a:p>
-            <a:r>
-              <a:rPr lang="en-US" dirty="0" err="1" smtClean="0"/>
-              <a:t>git</a:t>
-            </a:r>
-            <a:r>
-              <a:rPr lang="en-US" dirty="0" smtClean="0"/>
-              <a:t> branch take2</a:t>
-            </a:r>
-          </a:p>
-          <a:p>
-            <a:r>
-              <a:rPr lang="en-US" dirty="0" err="1" smtClean="0"/>
-              <a:t>git</a:t>
-            </a:r>
-            <a:r>
-              <a:rPr lang="en-US" dirty="0" smtClean="0"/>
-              <a:t> checkout take2</a:t>
-            </a:r>
-            <a:endParaRPr lang="en-US" dirty="0"/>
           </a:p>
         </p:txBody>
       </p:sp>
     </p:spTree>
     <p:extLst>
       <p:ext uri="{BB962C8B-B14F-4D97-AF65-F5344CB8AC3E}">
-        <p14:creationId xmlns:p14="http://schemas.microsoft.com/office/powerpoint/2010/main" val="1269040560"/>
+        <p14:creationId xmlns:p14="http://schemas.microsoft.com/office/powerpoint/2010/main" val="1148920223"/>
       </p:ext>
     </p:extLst>
   </p:cSld>
   <p:clrMapOvr>
     <a:masterClrMapping/>
   </p:clrMapOvr>
+  <p:timing>
+    <p:tnLst>
+      <p:par>
+        <p:cTn id="1" dur="indefinite" restart="never" nodeType="tmRoot"/>
+      </p:par>
+    </p:tnLst>
+  </p:timing>
 </p:sld>
 </file>
 
@@ -15248,8 +15165,12 @@
           <a:lstStyle/>
           <a:p>
             <a:r>
+              <a:rPr lang="en-US" dirty="0" err="1" smtClean="0"/>
+              <a:t>Git</a:t>
+            </a:r>
+            <a:r>
               <a:rPr lang="en-US" dirty="0" smtClean="0"/>
-              <a:t>What You Will Accomplish</a:t>
+              <a:t> Commands</a:t>
             </a:r>
             <a:endParaRPr lang="en-US" dirty="0"/>
           </a:p>
@@ -15265,35 +15186,125 @@
             <p:ph idx="1"/>
           </p:nvPr>
         </p:nvSpPr>
-        <p:spPr/>
+        <p:spPr>
+          <a:xfrm>
+            <a:off x="2589212" y="2133599"/>
+            <a:ext cx="8915400" cy="4236027"/>
+          </a:xfrm>
+        </p:spPr>
         <p:txBody>
-          <a:bodyPr/>
+          <a:bodyPr>
+            <a:normAutofit/>
+          </a:bodyPr>
           <a:lstStyle/>
           <a:p>
+            <a:r>
+              <a:rPr lang="en-US" dirty="0" err="1" smtClean="0"/>
+              <a:t>git</a:t>
+            </a:r>
             <a:r>
               <a:rPr lang="en-US" dirty="0" smtClean="0"/>
-              <a:t>Use data binding to select view-model</a:t>
+              <a:t> </a:t>
             </a:r>
-          </a:p>
-          <a:p>
+            <a:r>
+              <a:rPr lang="en-US" dirty="0"/>
+              <a:t>clone git://</a:t>
+            </a:r>
             <a:r>
               <a:rPr lang="en-US" dirty="0" smtClean="0"/>
-              <a:t>Use data template to select view</a:t>
+              <a:t>github.com/dallasxaml/ViewModelFirst.git</a:t>
             </a:r>
           </a:p>
           <a:p>
             <a:r>
               <a:rPr lang="en-US" dirty="0" smtClean="0"/>
-              <a:t>Navigate forward and backward through a stack</a:t>
+              <a:t>cd </a:t>
             </a:r>
-          </a:p>
-          <a:p>
+            <a:r>
+              <a:rPr lang="en-US" dirty="0" err="1" smtClean="0"/>
+              <a:t>ViewModelFirst</a:t>
+            </a:r>
+            <a:endParaRPr lang="en-US" dirty="0" smtClean="0"/>
+          </a:p>
+          <a:p>
+            <a:r>
+              <a:rPr lang="en-US" dirty="0" err="1" smtClean="0"/>
+              <a:t>git</a:t>
+            </a:r>
             <a:r>
               <a:rPr lang="en-US" dirty="0" smtClean="0"/>
-              <a:t>Navigate to selected data</a:t>
+              <a:t> branch take1</a:t>
             </a:r>
           </a:p>
           <a:p>
+            <a:r>
+              <a:rPr lang="en-US" dirty="0" err="1" smtClean="0"/>
+              <a:t>git</a:t>
+            </a:r>
+            <a:r>
+              <a:rPr lang="en-US" dirty="0" smtClean="0"/>
+              <a:t> checkout take1</a:t>
+            </a:r>
+          </a:p>
+          <a:p>
+            <a:r>
+              <a:rPr lang="en-US" dirty="0" err="1" smtClean="0"/>
+              <a:t>git</a:t>
+            </a:r>
+            <a:r>
+              <a:rPr lang="en-US" dirty="0" smtClean="0"/>
+              <a:t> add –A</a:t>
+            </a:r>
+          </a:p>
+          <a:p>
+            <a:r>
+              <a:rPr lang="en-US" dirty="0" err="1" smtClean="0"/>
+              <a:t>git</a:t>
+            </a:r>
+            <a:r>
+              <a:rPr lang="en-US" dirty="0" smtClean="0"/>
+              <a:t> commit –m “&lt;commit message&gt;”</a:t>
+            </a:r>
+          </a:p>
+          <a:p>
+            <a:r>
+              <a:rPr lang="en-US" dirty="0" err="1" smtClean="0"/>
+              <a:t>git</a:t>
+            </a:r>
+            <a:r>
+              <a:rPr lang="en-US" dirty="0" smtClean="0"/>
+              <a:t> checkout master</a:t>
+            </a:r>
+          </a:p>
+          <a:p>
+            <a:r>
+              <a:rPr lang="en-US" dirty="0" err="1" smtClean="0"/>
+              <a:t>git</a:t>
+            </a:r>
+            <a:r>
+              <a:rPr lang="en-US" dirty="0" smtClean="0"/>
+              <a:t> pull origin master</a:t>
+            </a:r>
+          </a:p>
+          <a:p>
+            <a:r>
+              <a:rPr lang="en-US" dirty="0" err="1" smtClean="0"/>
+              <a:t>git</a:t>
+            </a:r>
+            <a:r>
+              <a:rPr lang="en-US" dirty="0" smtClean="0"/>
+              <a:t> branch take2</a:t>
+            </a:r>
+          </a:p>
+          <a:p>
+            <a:r>
+              <a:rPr lang="en-US" dirty="0" err="1" smtClean="0"/>
+              <a:t>git</a:t>
+            </a:r>
+            <a:r>
+              <a:rPr lang="en-US" dirty="0" smtClean="0"/>
+              <a:t> checkout take2</a:t>
+            </a:r>
             <a:endParaRPr lang="en-US" dirty="0"/>
           </a:p>
         </p:txBody>
@@ -15301,13 +15312,20 @@
     </p:spTree>
     <p:extLst>
       <p:ext uri="{BB962C8B-B14F-4D97-AF65-F5344CB8AC3E}">
-        <p14:creationId xmlns:p14="http://schemas.microsoft.com/office/powerpoint/2010/main" val="2694266951"/>
+        <p14:creationId xmlns:p14="http://schemas.microsoft.com/office/powerpoint/2010/main" val="1269040560"/>
       </p:ext>
     </p:extLst>
   </p:cSld>
   <p:clrMapOvr>
     <a:masterClrMapping/>
   </p:clrMapOvr>
+  <p:timing>
+    <p:tnLst>
+      <p:par>
+        <p:cTn id="1" dur="indefinite" restart="never" nodeType="tmRoot"/>
+      </p:par>
+    </p:tnLst>
+  </p:timing>
 </p:sld>
 </file>
 
@@ -15345,7 +15363,7 @@
           <a:p>
             <a:r>
               <a:rPr lang="en-US" dirty="0" smtClean="0"/>
-              <a:t>Bursts</a:t>
+              <a:t>What You Will Accomplish</a:t>
             </a:r>
             <a:endParaRPr lang="en-US" dirty="0"/>
           </a:p>
@@ -15367,6 +15385,109 @@
           <a:lstStyle/>
           <a:p>
             <a:r>
+              <a:rPr lang="en-US" dirty="0" smtClean="0"/>
+              <a:t>Use data binding to select view-model</a:t>
+            </a:r>
+          </a:p>
+          <a:p>
+            <a:r>
+              <a:rPr lang="en-US" dirty="0" smtClean="0"/>
+              <a:t>Use data template to select view</a:t>
+            </a:r>
+          </a:p>
+          <a:p>
+            <a:r>
+              <a:rPr lang="en-US" dirty="0" smtClean="0"/>
+              <a:t>Navigate forward and backward through a stack</a:t>
+            </a:r>
+          </a:p>
+          <a:p>
+            <a:r>
+              <a:rPr lang="en-US" dirty="0" smtClean="0"/>
+              <a:t>Navigate to selected data</a:t>
+            </a:r>
+          </a:p>
+          <a:p>
+            <a:endParaRPr lang="en-US" dirty="0"/>
+          </a:p>
+        </p:txBody>
+      </p:sp>
+    </p:spTree>
+    <p:extLst>
+      <p:ext uri="{BB962C8B-B14F-4D97-AF65-F5344CB8AC3E}">
+        <p14:creationId xmlns:p14="http://schemas.microsoft.com/office/powerpoint/2010/main" val="2694266951"/>
+      </p:ext>
+    </p:extLst>
+  </p:cSld>
+  <p:clrMapOvr>
+    <a:masterClrMapping/>
+  </p:clrMapOvr>
+  <p:timing>
+    <p:tnLst>
+      <p:par>
+        <p:cTn id="1" dur="indefinite" restart="never" nodeType="tmRoot"/>
+      </p:par>
+    </p:tnLst>
+  </p:timing>
+</p:sld>
+</file>
+
+<file path=ppt/slides/slide6.xml><?xml version="1.0" encoding="utf-8"?>
+<p:sld xmlns:a="http://schemas.openxmlformats.org/drawingml/2006/main" xmlns:r="http://schemas.openxmlformats.org/officeDocument/2006/relationships" xmlns:p="http://schemas.openxmlformats.org/presentationml/2006/main">
+  <p:cSld>
+    <p:spTree>
+      <p:nvGrpSpPr>
+        <p:cNvPr id="1" name=""/>
+        <p:cNvGrpSpPr/>
+        <p:nvPr/>
+      </p:nvGrpSpPr>
+      <p:grpSpPr>
+        <a:xfrm>
+          <a:off x="0" y="0"/>
+          <a:ext cx="0" cy="0"/>
+          <a:chOff x="0" y="0"/>
+          <a:chExt cx="0" cy="0"/>
+        </a:xfrm>
+      </p:grpSpPr>
+      <p:sp>
+        <p:nvSpPr>
+          <p:cNvPr id="2" name="Title 1"/>
+          <p:cNvSpPr>
+            <a:spLocks noGrp="1"/>
+          </p:cNvSpPr>
+          <p:nvPr>
+            <p:ph type="title"/>
+          </p:nvPr>
+        </p:nvSpPr>
+        <p:spPr/>
+        <p:txBody>
+          <a:bodyPr/>
+          <a:lstStyle/>
+          <a:p>
+            <a:r>
+              <a:rPr lang="en-US" dirty="0" smtClean="0"/>
+              <a:t>Bursts</a:t>
+            </a:r>
+            <a:endParaRPr lang="en-US" dirty="0"/>
+          </a:p>
+        </p:txBody>
+      </p:sp>
+      <p:sp>
+        <p:nvSpPr>
+          <p:cNvPr id="3" name="Content Placeholder 2"/>
+          <p:cNvSpPr>
+            <a:spLocks noGrp="1"/>
+          </p:cNvSpPr>
+          <p:nvPr>
+            <p:ph idx="1"/>
+          </p:nvPr>
+        </p:nvSpPr>
+        <p:spPr/>
+        <p:txBody>
+          <a:bodyPr/>
+          <a:lstStyle/>
+          <a:p>
+            <a:r>
               <a:rPr lang="en-US" dirty="0" err="1" smtClean="0"/>
               <a:t>NavigationProvider.Contents</a:t>
             </a:r>
@@ -15413,6 +15534,13 @@
   <p:clrMapOvr>
     <a:masterClrMapping/>
   </p:clrMapOvr>
+  <p:timing>
+    <p:tnLst>
+      <p:par>
+        <p:cTn id="1" dur="indefinite" restart="never" nodeType="tmRoot"/>
+      </p:par>
+    </p:tnLst>
+  </p:timing>
 </p:sld>
 </file>
 

</xml_diff>